<commit_message>
update pptx pdf 5
</commit_message>
<xml_diff>
--- a/project-5/IDD-project5-presentation.pptx
+++ b/project-5/IDD-project5-presentation.pptx
@@ -38740,7 +38740,7 @@
           <p:nvPr>
             <p:extLst>
               <p:ext uri="{D42A27DB-BD31-4B8C-83A1-F6EECF244321}">
-                <p14:modId xmlns:p14="http://schemas.microsoft.com/office/powerpoint/2010/main" val="391619960"/>
+                <p14:modId xmlns:p14="http://schemas.microsoft.com/office/powerpoint/2010/main" val="2989416096"/>
               </p:ext>
             </p:extLst>
           </p:nvPr>
@@ -39012,7 +39012,7 @@
                     <a:p>
                       <a:pPr algn="ctr"/>
                       <a:r>
-                        <a:rPr lang="it-IT" sz="2400" b="0">
+                        <a:rPr lang="it-IT" sz="2400" b="0" dirty="0">
                           <a:solidFill>
                             <a:schemeClr val="bg1"/>
                           </a:solidFill>
@@ -39040,7 +39040,7 @@
                     <a:p>
                       <a:pPr algn="ctr"/>
                       <a:r>
-                        <a:rPr lang="it-IT" sz="2400" b="0">
+                        <a:rPr lang="it-IT" sz="2400" b="0" dirty="0">
                           <a:solidFill>
                             <a:schemeClr val="bg1"/>
                           </a:solidFill>
@@ -39214,7 +39214,7 @@
                     <a:p>
                       <a:pPr algn="ctr"/>
                       <a:r>
-                        <a:rPr lang="it-IT" sz="2400" b="0" u="sng" dirty="0">
+                        <a:rPr lang="it-IT" sz="2400" b="0" u="none" dirty="0">
                           <a:solidFill>
                             <a:schemeClr val="bg1"/>
                           </a:solidFill>
@@ -40736,36 +40736,41 @@
             <p:ph idx="1"/>
           </p:nvPr>
         </p:nvSpPr>
-        <p:spPr/>
+        <p:spPr>
+          <a:xfrm>
+            <a:off x="838200" y="2146655"/>
+            <a:ext cx="10515600" cy="3545204"/>
+          </a:xfrm>
+        </p:spPr>
         <p:txBody>
           <a:bodyPr/>
           <a:lstStyle/>
           <a:p>
             <a:r>
-              <a:rPr lang="it-IT"/>
+              <a:rPr lang="it-IT" dirty="0"/>
               <a:t>Il progetto si è focalizzato sull’integrazione di 16 sorgenti contenenti dati su varie aziende</a:t>
             </a:r>
           </a:p>
           <a:p>
             <a:r>
-              <a:rPr lang="it-IT"/>
+              <a:rPr lang="it-IT" dirty="0"/>
               <a:t>Ovviamente diverse aziende avevano diversi campi (attributi) per descrivere i dati aziendali</a:t>
             </a:r>
           </a:p>
           <a:p>
             <a:r>
-              <a:rPr lang="it-IT"/>
+              <a:rPr lang="it-IT" dirty="0"/>
               <a:t>Per esempio erano spesso presenti attributi come «nome», «market </a:t>
             </a:r>
             <a:r>
-              <a:rPr lang="it-IT" err="1"/>
+              <a:rPr lang="it-IT" dirty="0" err="1"/>
               <a:t>cap</a:t>
             </a:r>
             <a:r>
-              <a:rPr lang="it-IT"/>
+              <a:rPr lang="it-IT" dirty="0"/>
               <a:t>», «website» …</a:t>
             </a:r>
-            <a:endParaRPr lang="en-US"/>
+            <a:endParaRPr lang="en-US" dirty="0"/>
           </a:p>
         </p:txBody>
       </p:sp>
@@ -48338,6 +48343,24 @@
 </file>
 
 <file path=customXml/item1.xml><?xml version="1.0" encoding="utf-8"?>
+<p:properties xmlns:p="http://schemas.microsoft.com/office/2006/metadata/properties" xmlns:xsi="http://www.w3.org/2001/XMLSchema-instance" xmlns:pc="http://schemas.microsoft.com/office/infopath/2007/PartnerControls">
+  <documentManagement>
+    <MediaServiceKeyPoints xmlns="0201da8c-1c73-453f-858d-123e44f7474c" xsi:nil="true"/>
+    <_activity xmlns="0201da8c-1c73-453f-858d-123e44f7474c" xsi:nil="true"/>
+  </documentManagement>
+</p:properties>
+</file>
+
+<file path=customXml/item2.xml><?xml version="1.0" encoding="utf-8"?>
+<?mso-contentType ?>
+<FormTemplates xmlns="http://schemas.microsoft.com/sharepoint/v3/contenttype/forms">
+  <Display>DocumentLibraryForm</Display>
+  <Edit>DocumentLibraryForm</Edit>
+  <New>DocumentLibraryForm</New>
+</FormTemplates>
+</file>
+
+<file path=customXml/item3.xml><?xml version="1.0" encoding="utf-8"?>
 <ct:contentTypeSchema xmlns:ct="http://schemas.microsoft.com/office/2006/metadata/contentType" xmlns:ma="http://schemas.microsoft.com/office/2006/metadata/properties/metaAttributes" ct:_="" ma:_="" ma:contentTypeName="Documento" ma:contentTypeID="0x010100085A20C8BC3DD5458F70DD55CCBA85FC" ma:contentTypeVersion="8" ma:contentTypeDescription="Creare un nuovo documento." ma:contentTypeScope="" ma:versionID="a60485f95731a956cbfa1386d5fe1d2b">
   <xsd:schema xmlns:xsd="http://www.w3.org/2001/XMLSchema" xmlns:xs="http://www.w3.org/2001/XMLSchema" xmlns:p="http://schemas.microsoft.com/office/2006/metadata/properties" xmlns:ns3="0201da8c-1c73-453f-858d-123e44f7474c" targetNamespace="http://schemas.microsoft.com/office/2006/metadata/properties" ma:root="true" ma:fieldsID="3f649a8787044d9c0a4068a8d0734d63" ns3:_="">
     <xsd:import namespace="0201da8c-1c73-453f-858d-123e44f7474c"/>
@@ -48507,25 +48530,31 @@
 </ct:contentTypeSchema>
 </file>
 
-<file path=customXml/item2.xml><?xml version="1.0" encoding="utf-8"?>
-<?mso-contentType ?>
-<FormTemplates xmlns="http://schemas.microsoft.com/sharepoint/v3/contenttype/forms">
-  <Display>DocumentLibraryForm</Display>
-  <Edit>DocumentLibraryForm</Edit>
-  <New>DocumentLibraryForm</New>
-</FormTemplates>
+<file path=customXml/itemProps1.xml><?xml version="1.0" encoding="utf-8"?>
+<ds:datastoreItem xmlns:ds="http://schemas.openxmlformats.org/officeDocument/2006/customXml" ds:itemID="{0E506F55-A469-454B-8FCA-6F8BCF9DAA6B}">
+  <ds:schemaRefs>
+    <ds:schemaRef ds:uri="http://purl.org/dc/elements/1.1/"/>
+    <ds:schemaRef ds:uri="0201da8c-1c73-453f-858d-123e44f7474c"/>
+    <ds:schemaRef ds:uri="http://www.w3.org/XML/1998/namespace"/>
+    <ds:schemaRef ds:uri="http://schemas.microsoft.com/office/2006/documentManagement/types"/>
+    <ds:schemaRef ds:uri="http://purl.org/dc/terms/"/>
+    <ds:schemaRef ds:uri="http://schemas.microsoft.com/office/infopath/2007/PartnerControls"/>
+    <ds:schemaRef ds:uri="http://schemas.openxmlformats.org/package/2006/metadata/core-properties"/>
+    <ds:schemaRef ds:uri="http://schemas.microsoft.com/office/2006/metadata/properties"/>
+    <ds:schemaRef ds:uri="http://purl.org/dc/dcmitype/"/>
+  </ds:schemaRefs>
+</ds:datastoreItem>
 </file>
 
-<file path=customXml/item3.xml><?xml version="1.0" encoding="utf-8"?>
-<p:properties xmlns:p="http://schemas.microsoft.com/office/2006/metadata/properties" xmlns:xsi="http://www.w3.org/2001/XMLSchema-instance" xmlns:pc="http://schemas.microsoft.com/office/infopath/2007/PartnerControls">
-  <documentManagement>
-    <MediaServiceKeyPoints xmlns="0201da8c-1c73-453f-858d-123e44f7474c" xsi:nil="true"/>
-    <_activity xmlns="0201da8c-1c73-453f-858d-123e44f7474c" xsi:nil="true"/>
-  </documentManagement>
-</p:properties>
+<file path=customXml/itemProps2.xml><?xml version="1.0" encoding="utf-8"?>
+<ds:datastoreItem xmlns:ds="http://schemas.openxmlformats.org/officeDocument/2006/customXml" ds:itemID="{8C0CC34A-D535-41BC-8B48-A0E1EA32D7E8}">
+  <ds:schemaRefs>
+    <ds:schemaRef ds:uri="http://schemas.microsoft.com/sharepoint/v3/contenttype/forms"/>
+  </ds:schemaRefs>
+</ds:datastoreItem>
 </file>
 
-<file path=customXml/itemProps1.xml><?xml version="1.0" encoding="utf-8"?>
+<file path=customXml/itemProps3.xml><?xml version="1.0" encoding="utf-8"?>
 <ds:datastoreItem xmlns:ds="http://schemas.openxmlformats.org/officeDocument/2006/customXml" ds:itemID="{4150A741-67F4-4CEF-85C7-4BAE7A80DEC4}">
   <ds:schemaRefs>
     <ds:schemaRef ds:uri="0201da8c-1c73-453f-858d-123e44f7474c"/>
@@ -48543,30 +48572,6 @@
 </ds:datastoreItem>
 </file>
 
-<file path=customXml/itemProps2.xml><?xml version="1.0" encoding="utf-8"?>
-<ds:datastoreItem xmlns:ds="http://schemas.openxmlformats.org/officeDocument/2006/customXml" ds:itemID="{8C0CC34A-D535-41BC-8B48-A0E1EA32D7E8}">
-  <ds:schemaRefs>
-    <ds:schemaRef ds:uri="http://schemas.microsoft.com/sharepoint/v3/contenttype/forms"/>
-  </ds:schemaRefs>
-</ds:datastoreItem>
-</file>
-
-<file path=customXml/itemProps3.xml><?xml version="1.0" encoding="utf-8"?>
-<ds:datastoreItem xmlns:ds="http://schemas.openxmlformats.org/officeDocument/2006/customXml" ds:itemID="{0E506F55-A469-454B-8FCA-6F8BCF9DAA6B}">
-  <ds:schemaRefs>
-    <ds:schemaRef ds:uri="http://purl.org/dc/elements/1.1/"/>
-    <ds:schemaRef ds:uri="0201da8c-1c73-453f-858d-123e44f7474c"/>
-    <ds:schemaRef ds:uri="http://www.w3.org/XML/1998/namespace"/>
-    <ds:schemaRef ds:uri="http://schemas.microsoft.com/office/2006/documentManagement/types"/>
-    <ds:schemaRef ds:uri="http://purl.org/dc/terms/"/>
-    <ds:schemaRef ds:uri="http://schemas.microsoft.com/office/infopath/2007/PartnerControls"/>
-    <ds:schemaRef ds:uri="http://schemas.openxmlformats.org/package/2006/metadata/core-properties"/>
-    <ds:schemaRef ds:uri="http://schemas.microsoft.com/office/2006/metadata/properties"/>
-    <ds:schemaRef ds:uri="http://purl.org/dc/dcmitype/"/>
-  </ds:schemaRefs>
-</ds:datastoreItem>
-</file>
-
 <file path=docMetadata/LabelInfo.xml><?xml version="1.0" encoding="utf-8"?>
 <clbl:labelList xmlns:clbl="http://schemas.microsoft.com/office/2020/mipLabelMetadata">
   <clbl:label id="{f42aa342-8706-4288-bd11-ebb85995028c}" enabled="1" method="Standard" siteId="{72f988bf-86f1-41af-91ab-2d7cd011db47}" contentBits="0" removed="0"/>

</xml_diff>

<commit_message>
update pptx 4 5
</commit_message>
<xml_diff>
--- a/project-5/IDD-project5-presentation.pptx
+++ b/project-5/IDD-project5-presentation.pptx
@@ -38319,7 +38319,7 @@
                 </a:solidFill>
                 <a:effectLst/>
               </a:rPr>
-              <a:t>~ 1.5</a:t>
+              <a:t>~ 1.5h</a:t>
             </a:r>
           </a:p>
           <a:p>
@@ -38328,7 +38328,7 @@
               <a:buChar char="•"/>
             </a:pPr>
             <a:r>
-              <a:rPr lang="en-US" sz="2800">
+              <a:rPr lang="en-US" sz="2800" dirty="0">
                 <a:solidFill>
                   <a:schemeClr val="bg1"/>
                 </a:solidFill>
@@ -38336,7 +38336,7 @@
               <a:t>(150 </a:t>
             </a:r>
             <a:r>
-              <a:rPr lang="en-US" sz="2800" err="1">
+              <a:rPr lang="en-US" sz="2800" dirty="0" err="1">
                 <a:solidFill>
                   <a:schemeClr val="bg1"/>
                 </a:solidFill>
@@ -38344,14 +38344,14 @@
               <a:t>coppie</a:t>
             </a:r>
             <a:r>
-              <a:rPr lang="en-US" sz="2800">
+              <a:rPr lang="en-US" sz="2800" dirty="0">
                 <a:solidFill>
                   <a:schemeClr val="bg1"/>
                 </a:solidFill>
               </a:rPr>
               <a:t> in match)</a:t>
             </a:r>
-            <a:endParaRPr lang="it-IT" sz="2800" i="0">
+            <a:endParaRPr lang="it-IT" sz="2800" i="0" dirty="0">
               <a:solidFill>
                 <a:srgbClr val="000000"/>
               </a:solidFill>
@@ -38364,7 +38364,7 @@
               <a:buChar char="•"/>
             </a:pPr>
             <a:r>
-              <a:rPr lang="it-IT" sz="2800" b="1">
+              <a:rPr lang="it-IT" sz="2800" b="1" dirty="0">
                 <a:solidFill>
                   <a:schemeClr val="bg1"/>
                 </a:solidFill>
@@ -38372,7 +38372,7 @@
               <a:t>Metriche utilizzate</a:t>
             </a:r>
             <a:r>
-              <a:rPr lang="it-IT" sz="2800">
+              <a:rPr lang="it-IT" sz="2800" dirty="0">
                 <a:solidFill>
                   <a:schemeClr val="bg1"/>
                 </a:solidFill>
@@ -38386,7 +38386,7 @@
               <a:buChar char="•"/>
             </a:pPr>
             <a:r>
-              <a:rPr lang="it-IT" sz="2800" i="0">
+              <a:rPr lang="it-IT" sz="2800" i="0" dirty="0">
                 <a:solidFill>
                   <a:schemeClr val="bg1"/>
                 </a:solidFill>
@@ -38401,7 +38401,7 @@
               <a:buChar char="•"/>
             </a:pPr>
             <a:r>
-              <a:rPr lang="it-IT" sz="2800">
+              <a:rPr lang="it-IT" sz="2800" dirty="0">
                 <a:solidFill>
                   <a:schemeClr val="bg1"/>
                 </a:solidFill>
@@ -38415,14 +38415,14 @@
               <a:buChar char="•"/>
             </a:pPr>
             <a:r>
-              <a:rPr lang="it-IT" sz="2800">
+              <a:rPr lang="it-IT" sz="2800" dirty="0">
                 <a:solidFill>
                   <a:schemeClr val="bg1"/>
                 </a:solidFill>
               </a:rPr>
               <a:t>F1</a:t>
             </a:r>
-            <a:endParaRPr lang="it-IT" sz="2800" i="0">
+            <a:endParaRPr lang="it-IT" sz="2800" i="0" dirty="0">
               <a:solidFill>
                 <a:srgbClr val="000000"/>
               </a:solidFill>
@@ -38430,7 +38430,7 @@
             </a:endParaRPr>
           </a:p>
           <a:p>
-            <a:endParaRPr lang="en-US" sz="2600" i="0">
+            <a:endParaRPr lang="en-US" sz="2600" i="0" dirty="0">
               <a:solidFill>
                 <a:schemeClr val="bg1"/>
               </a:solidFill>
@@ -41293,7 +41293,7 @@
           <p:nvPr>
             <p:extLst>
               <p:ext uri="{D42A27DB-BD31-4B8C-83A1-F6EECF244321}">
-                <p14:modId xmlns:p14="http://schemas.microsoft.com/office/powerpoint/2010/main" val="946786269"/>
+                <p14:modId xmlns:p14="http://schemas.microsoft.com/office/powerpoint/2010/main" val="1784728371"/>
               </p:ext>
             </p:extLst>
           </p:nvPr>
@@ -41435,7 +41435,7 @@
                     <a:lstStyle/>
                     <a:p>
                       <a:r>
-                        <a:rPr lang="it-IT" err="1">
+                        <a:rPr lang="it-IT" dirty="0" err="1">
                           <a:solidFill>
                             <a:schemeClr val="bg1"/>
                           </a:solidFill>
@@ -41443,7 +41443,7 @@
                         <a:t>Categories</a:t>
                       </a:r>
                       <a:r>
-                        <a:rPr lang="it-IT">
+                        <a:rPr lang="it-IT" dirty="0">
                           <a:solidFill>
                             <a:schemeClr val="bg1"/>
                           </a:solidFill>
@@ -41451,14 +41451,22 @@
                         <a:t>, Industry, Business, Company Business, </a:t>
                       </a:r>
                       <a:r>
-                        <a:rPr lang="it-IT" err="1">
+                        <a:rPr lang="it-IT" dirty="0" err="1">
                           <a:solidFill>
                             <a:schemeClr val="bg1"/>
                           </a:solidFill>
                         </a:rPr>
                         <a:t>Category</a:t>
                       </a:r>
-                      <a:endParaRPr lang="en-US"/>
+                      <a:r>
+                        <a:rPr lang="it-IT" dirty="0">
+                          <a:solidFill>
+                            <a:schemeClr val="bg1"/>
+                          </a:solidFill>
+                        </a:rPr>
+                        <a:t>, Sector</a:t>
+                      </a:r>
+                      <a:endParaRPr lang="en-US" dirty="0"/>
                     </a:p>
                   </a:txBody>
                   <a:tcPr/>
@@ -48343,24 +48351,6 @@
 </file>
 
 <file path=customXml/item1.xml><?xml version="1.0" encoding="utf-8"?>
-<p:properties xmlns:p="http://schemas.microsoft.com/office/2006/metadata/properties" xmlns:xsi="http://www.w3.org/2001/XMLSchema-instance" xmlns:pc="http://schemas.microsoft.com/office/infopath/2007/PartnerControls">
-  <documentManagement>
-    <MediaServiceKeyPoints xmlns="0201da8c-1c73-453f-858d-123e44f7474c" xsi:nil="true"/>
-    <_activity xmlns="0201da8c-1c73-453f-858d-123e44f7474c" xsi:nil="true"/>
-  </documentManagement>
-</p:properties>
-</file>
-
-<file path=customXml/item2.xml><?xml version="1.0" encoding="utf-8"?>
-<?mso-contentType ?>
-<FormTemplates xmlns="http://schemas.microsoft.com/sharepoint/v3/contenttype/forms">
-  <Display>DocumentLibraryForm</Display>
-  <Edit>DocumentLibraryForm</Edit>
-  <New>DocumentLibraryForm</New>
-</FormTemplates>
-</file>
-
-<file path=customXml/item3.xml><?xml version="1.0" encoding="utf-8"?>
 <ct:contentTypeSchema xmlns:ct="http://schemas.microsoft.com/office/2006/metadata/contentType" xmlns:ma="http://schemas.microsoft.com/office/2006/metadata/properties/metaAttributes" ct:_="" ma:_="" ma:contentTypeName="Documento" ma:contentTypeID="0x010100085A20C8BC3DD5458F70DD55CCBA85FC" ma:contentTypeVersion="8" ma:contentTypeDescription="Creare un nuovo documento." ma:contentTypeScope="" ma:versionID="a60485f95731a956cbfa1386d5fe1d2b">
   <xsd:schema xmlns:xsd="http://www.w3.org/2001/XMLSchema" xmlns:xs="http://www.w3.org/2001/XMLSchema" xmlns:p="http://schemas.microsoft.com/office/2006/metadata/properties" xmlns:ns3="0201da8c-1c73-453f-858d-123e44f7474c" targetNamespace="http://schemas.microsoft.com/office/2006/metadata/properties" ma:root="true" ma:fieldsID="3f649a8787044d9c0a4068a8d0734d63" ns3:_="">
     <xsd:import namespace="0201da8c-1c73-453f-858d-123e44f7474c"/>
@@ -48530,31 +48520,25 @@
 </ct:contentTypeSchema>
 </file>
 
-<file path=customXml/itemProps1.xml><?xml version="1.0" encoding="utf-8"?>
-<ds:datastoreItem xmlns:ds="http://schemas.openxmlformats.org/officeDocument/2006/customXml" ds:itemID="{0E506F55-A469-454B-8FCA-6F8BCF9DAA6B}">
-  <ds:schemaRefs>
-    <ds:schemaRef ds:uri="http://purl.org/dc/elements/1.1/"/>
-    <ds:schemaRef ds:uri="0201da8c-1c73-453f-858d-123e44f7474c"/>
-    <ds:schemaRef ds:uri="http://www.w3.org/XML/1998/namespace"/>
-    <ds:schemaRef ds:uri="http://schemas.microsoft.com/office/2006/documentManagement/types"/>
-    <ds:schemaRef ds:uri="http://purl.org/dc/terms/"/>
-    <ds:schemaRef ds:uri="http://schemas.microsoft.com/office/infopath/2007/PartnerControls"/>
-    <ds:schemaRef ds:uri="http://schemas.openxmlformats.org/package/2006/metadata/core-properties"/>
-    <ds:schemaRef ds:uri="http://schemas.microsoft.com/office/2006/metadata/properties"/>
-    <ds:schemaRef ds:uri="http://purl.org/dc/dcmitype/"/>
-  </ds:schemaRefs>
-</ds:datastoreItem>
+<file path=customXml/item2.xml><?xml version="1.0" encoding="utf-8"?>
+<?mso-contentType ?>
+<FormTemplates xmlns="http://schemas.microsoft.com/sharepoint/v3/contenttype/forms">
+  <Display>DocumentLibraryForm</Display>
+  <Edit>DocumentLibraryForm</Edit>
+  <New>DocumentLibraryForm</New>
+</FormTemplates>
 </file>
 
-<file path=customXml/itemProps2.xml><?xml version="1.0" encoding="utf-8"?>
-<ds:datastoreItem xmlns:ds="http://schemas.openxmlformats.org/officeDocument/2006/customXml" ds:itemID="{8C0CC34A-D535-41BC-8B48-A0E1EA32D7E8}">
-  <ds:schemaRefs>
-    <ds:schemaRef ds:uri="http://schemas.microsoft.com/sharepoint/v3/contenttype/forms"/>
-  </ds:schemaRefs>
-</ds:datastoreItem>
+<file path=customXml/item3.xml><?xml version="1.0" encoding="utf-8"?>
+<p:properties xmlns:p="http://schemas.microsoft.com/office/2006/metadata/properties" xmlns:xsi="http://www.w3.org/2001/XMLSchema-instance" xmlns:pc="http://schemas.microsoft.com/office/infopath/2007/PartnerControls">
+  <documentManagement>
+    <MediaServiceKeyPoints xmlns="0201da8c-1c73-453f-858d-123e44f7474c" xsi:nil="true"/>
+    <_activity xmlns="0201da8c-1c73-453f-858d-123e44f7474c" xsi:nil="true"/>
+  </documentManagement>
+</p:properties>
 </file>
 
-<file path=customXml/itemProps3.xml><?xml version="1.0" encoding="utf-8"?>
+<file path=customXml/itemProps1.xml><?xml version="1.0" encoding="utf-8"?>
 <ds:datastoreItem xmlns:ds="http://schemas.openxmlformats.org/officeDocument/2006/customXml" ds:itemID="{4150A741-67F4-4CEF-85C7-4BAE7A80DEC4}">
   <ds:schemaRefs>
     <ds:schemaRef ds:uri="0201da8c-1c73-453f-858d-123e44f7474c"/>
@@ -48572,6 +48556,30 @@
 </ds:datastoreItem>
 </file>
 
+<file path=customXml/itemProps2.xml><?xml version="1.0" encoding="utf-8"?>
+<ds:datastoreItem xmlns:ds="http://schemas.openxmlformats.org/officeDocument/2006/customXml" ds:itemID="{8C0CC34A-D535-41BC-8B48-A0E1EA32D7E8}">
+  <ds:schemaRefs>
+    <ds:schemaRef ds:uri="http://schemas.microsoft.com/sharepoint/v3/contenttype/forms"/>
+  </ds:schemaRefs>
+</ds:datastoreItem>
+</file>
+
+<file path=customXml/itemProps3.xml><?xml version="1.0" encoding="utf-8"?>
+<ds:datastoreItem xmlns:ds="http://schemas.openxmlformats.org/officeDocument/2006/customXml" ds:itemID="{0E506F55-A469-454B-8FCA-6F8BCF9DAA6B}">
+  <ds:schemaRefs>
+    <ds:schemaRef ds:uri="http://purl.org/dc/elements/1.1/"/>
+    <ds:schemaRef ds:uri="0201da8c-1c73-453f-858d-123e44f7474c"/>
+    <ds:schemaRef ds:uri="http://www.w3.org/XML/1998/namespace"/>
+    <ds:schemaRef ds:uri="http://schemas.microsoft.com/office/2006/documentManagement/types"/>
+    <ds:schemaRef ds:uri="http://purl.org/dc/terms/"/>
+    <ds:schemaRef ds:uri="http://schemas.microsoft.com/office/infopath/2007/PartnerControls"/>
+    <ds:schemaRef ds:uri="http://schemas.openxmlformats.org/package/2006/metadata/core-properties"/>
+    <ds:schemaRef ds:uri="http://schemas.microsoft.com/office/2006/metadata/properties"/>
+    <ds:schemaRef ds:uri="http://purl.org/dc/dcmitype/"/>
+  </ds:schemaRefs>
+</ds:datastoreItem>
+</file>
+
 <file path=docMetadata/LabelInfo.xml><?xml version="1.0" encoding="utf-8"?>
 <clbl:labelList xmlns:clbl="http://schemas.microsoft.com/office/2020/mipLabelMetadata">
   <clbl:label id="{f42aa342-8706-4288-bd11-ebb85995028c}" enabled="1" method="Standard" siteId="{72f988bf-86f1-41af-91ab-2d7cd011db47}" contentBits="0" removed="0"/>

</xml_diff>